<commit_message>
modified slides and updates slides link in read me file
</commit_message>
<xml_diff>
--- a/slides/AI_slides.pptx
+++ b/slides/AI_slides.pptx
@@ -3409,7 +3409,7 @@
         <p:spPr>
           <a:xfrm rot="0">
             <a:off x="2879116" y="-3136"/>
-            <a:ext cx="13740029" cy="679411"/>
+            <a:ext cx="13740029" cy="1384300"/>
           </a:xfrm>
           <a:prstGeom prst="rect">
             <a:avLst/>
@@ -3420,6 +3420,25 @@
             <a:spAutoFit/>
           </a:bodyPr>
           <a:lstStyle/>
+          <a:p>
+            <a:pPr algn="l">
+              <a:lnSpc>
+                <a:spcPts val="5599"/>
+              </a:lnSpc>
+            </a:pPr>
+            <a:r>
+              <a:rPr lang="en-US" sz="3999" b="true">
+                <a:solidFill>
+                  <a:srgbClr val="000000"/>
+                </a:solidFill>
+                <a:latin typeface="Canva Sans Bold"/>
+                <a:ea typeface="Canva Sans Bold"/>
+                <a:cs typeface="Canva Sans Bold"/>
+                <a:sym typeface="Canva Sans Bold"/>
+              </a:rPr>
+              <a:t>Branch and Bound ( frozen lake )</a:t>
+            </a:r>
+          </a:p>
           <a:p>
             <a:pPr algn="l">
               <a:lnSpc>
@@ -3439,7 +3458,7 @@
                 <a:cs typeface="Canva Sans Bold"/>
                 <a:sym typeface="Canva Sans Bold"/>
               </a:rPr>
-              <a:t>Branch and Bound using frozen lake environment </a:t>
+              <a:t> </a:t>
             </a:r>
           </a:p>
         </p:txBody>
@@ -3623,8 +3642,8 @@
         </p:nvSpPr>
         <p:spPr>
           <a:xfrm rot="0">
-            <a:off x="6078319" y="-76200"/>
-            <a:ext cx="6131361" cy="712499"/>
+            <a:off x="4467175" y="-76200"/>
+            <a:ext cx="9353649" cy="712471"/>
           </a:xfrm>
           <a:prstGeom prst="rect">
             <a:avLst/>
@@ -3654,7 +3673,7 @@
                 <a:cs typeface="Canva Sans Bold"/>
                 <a:sym typeface="Canva Sans Bold"/>
               </a:rPr>
-              <a:t>Iterative  Deepening A* </a:t>
+              <a:t>Iterative  Deepening A*(frozen lake) </a:t>
             </a:r>
           </a:p>
         </p:txBody>
@@ -3838,8 +3857,8 @@
         </p:nvSpPr>
         <p:spPr>
           <a:xfrm rot="0">
-            <a:off x="7546489" y="-76200"/>
-            <a:ext cx="3195022" cy="679411"/>
+            <a:off x="5924935" y="-130241"/>
+            <a:ext cx="6202362" cy="733492"/>
           </a:xfrm>
           <a:prstGeom prst="rect">
             <a:avLst/>
@@ -3853,14 +3872,14 @@
           <a:p>
             <a:pPr algn="ctr">
               <a:lnSpc>
-                <a:spcPts val="5599"/>
+                <a:spcPts val="6013"/>
               </a:lnSpc>
               <a:spcBef>
                 <a:spcPct val="0"/>
               </a:spcBef>
             </a:pPr>
             <a:r>
-              <a:rPr lang="en-US" b="true" sz="3999">
+              <a:rPr lang="en-US" b="true" sz="4295">
                 <a:solidFill>
                   <a:srgbClr val="000000"/>
                 </a:solidFill>
@@ -3869,7 +3888,7 @@
                 <a:cs typeface="Canva Sans Bold"/>
                 <a:sym typeface="Canva Sans Bold"/>
               </a:rPr>
-              <a:t>Hill Climbing</a:t>
+              <a:t>Hill Climbing (eli76 tsp)</a:t>
             </a:r>
           </a:p>
         </p:txBody>
@@ -4120,7 +4139,7 @@
         <p:spPr>
           <a:xfrm rot="0">
             <a:off x="4598390" y="-76200"/>
-            <a:ext cx="9091220" cy="712499"/>
+            <a:ext cx="9091220" cy="712471"/>
           </a:xfrm>
           <a:prstGeom prst="rect">
             <a:avLst/>
@@ -4150,7 +4169,7 @@
                 <a:cs typeface="Canva Sans Bold"/>
                 <a:sym typeface="Canva Sans Bold"/>
               </a:rPr>
-              <a:t>Stimulated Annealing </a:t>
+              <a:t>Stimulated Annealing (eli76 tsp)</a:t>
             </a:r>
           </a:p>
         </p:txBody>

</xml_diff>